<commit_message>
Correções propostas na doc
</commit_message>
<xml_diff>
--- a/docs/Apresentação Teste TCC.pptx
+++ b/docs/Apresentação Teste TCC.pptx
@@ -849,7 +849,7 @@
             <a:fld id="{5586B75A-687E-405C-8A0B-8D00578BA2C3}" type="datetimeFigureOut">
               <a:rPr lang="en-US" smtClean="0"/>
               <a:pPr/>
-              <a:t>12/14/2017</a:t>
+              <a:t>12/15/2017</a:t>
             </a:fld>
             <a:endParaRPr lang="en-US" dirty="0"/>
           </a:p>
@@ -1102,7 +1102,7 @@
             <a:fld id="{5586B75A-687E-405C-8A0B-8D00578BA2C3}" type="datetimeFigureOut">
               <a:rPr lang="en-US" smtClean="0"/>
               <a:pPr/>
-              <a:t>12/14/2017</a:t>
+              <a:t>12/15/2017</a:t>
             </a:fld>
             <a:endParaRPr lang="en-US" dirty="0"/>
           </a:p>
@@ -1419,7 +1419,7 @@
             <a:fld id="{5586B75A-687E-405C-8A0B-8D00578BA2C3}" type="datetimeFigureOut">
               <a:rPr lang="en-US" smtClean="0"/>
               <a:pPr/>
-              <a:t>12/14/2017</a:t>
+              <a:t>12/15/2017</a:t>
             </a:fld>
             <a:endParaRPr lang="en-US" dirty="0"/>
           </a:p>
@@ -1763,7 +1763,7 @@
             <a:fld id="{5586B75A-687E-405C-8A0B-8D00578BA2C3}" type="datetimeFigureOut">
               <a:rPr lang="en-US" smtClean="0"/>
               <a:pPr/>
-              <a:t>12/14/2017</a:t>
+              <a:t>12/15/2017</a:t>
             </a:fld>
             <a:endParaRPr lang="en-US" dirty="0"/>
           </a:p>
@@ -2080,7 +2080,7 @@
             <a:fld id="{5586B75A-687E-405C-8A0B-8D00578BA2C3}" type="datetimeFigureOut">
               <a:rPr lang="en-US" smtClean="0"/>
               <a:pPr/>
-              <a:t>12/14/2017</a:t>
+              <a:t>12/15/2017</a:t>
             </a:fld>
             <a:endParaRPr lang="en-US" dirty="0"/>
           </a:p>
@@ -2476,7 +2476,7 @@
             <a:fld id="{5586B75A-687E-405C-8A0B-8D00578BA2C3}" type="datetimeFigureOut">
               <a:rPr lang="en-US" smtClean="0"/>
               <a:pPr/>
-              <a:t>12/14/2017</a:t>
+              <a:t>12/15/2017</a:t>
             </a:fld>
             <a:endParaRPr lang="en-US" dirty="0"/>
           </a:p>
@@ -2649,7 +2649,7 @@
             <a:fld id="{5586B75A-687E-405C-8A0B-8D00578BA2C3}" type="datetimeFigureOut">
               <a:rPr lang="en-US" smtClean="0"/>
               <a:pPr/>
-              <a:t>12/14/2017</a:t>
+              <a:t>12/15/2017</a:t>
             </a:fld>
             <a:endParaRPr lang="en-US" dirty="0"/>
           </a:p>
@@ -2831,7 +2831,7 @@
             <a:fld id="{5586B75A-687E-405C-8A0B-8D00578BA2C3}" type="datetimeFigureOut">
               <a:rPr lang="en-US" smtClean="0"/>
               <a:pPr/>
-              <a:t>12/14/2017</a:t>
+              <a:t>12/15/2017</a:t>
             </a:fld>
             <a:endParaRPr lang="en-US" dirty="0"/>
           </a:p>
@@ -3009,7 +3009,7 @@
             <a:fld id="{5586B75A-687E-405C-8A0B-8D00578BA2C3}" type="datetimeFigureOut">
               <a:rPr lang="en-US" smtClean="0"/>
               <a:pPr/>
-              <a:t>12/14/2017</a:t>
+              <a:t>12/15/2017</a:t>
             </a:fld>
             <a:endParaRPr lang="en-US" dirty="0"/>
           </a:p>
@@ -3258,7 +3258,7 @@
             <a:fld id="{5586B75A-687E-405C-8A0B-8D00578BA2C3}" type="datetimeFigureOut">
               <a:rPr lang="en-US" smtClean="0"/>
               <a:pPr/>
-              <a:t>12/14/2017</a:t>
+              <a:t>12/15/2017</a:t>
             </a:fld>
             <a:endParaRPr lang="en-US" dirty="0"/>
           </a:p>
@@ -3492,7 +3492,7 @@
             <a:fld id="{5586B75A-687E-405C-8A0B-8D00578BA2C3}" type="datetimeFigureOut">
               <a:rPr lang="en-US" smtClean="0"/>
               <a:pPr/>
-              <a:t>12/14/2017</a:t>
+              <a:t>12/15/2017</a:t>
             </a:fld>
             <a:endParaRPr lang="en-US" dirty="0"/>
           </a:p>
@@ -3868,7 +3868,7 @@
             <a:fld id="{5586B75A-687E-405C-8A0B-8D00578BA2C3}" type="datetimeFigureOut">
               <a:rPr lang="en-US" smtClean="0"/>
               <a:pPr/>
-              <a:t>12/14/2017</a:t>
+              <a:t>12/15/2017</a:t>
             </a:fld>
             <a:endParaRPr lang="en-US" dirty="0"/>
           </a:p>
@@ -3993,7 +3993,7 @@
             <a:fld id="{5586B75A-687E-405C-8A0B-8D00578BA2C3}" type="datetimeFigureOut">
               <a:rPr lang="en-US" smtClean="0"/>
               <a:pPr/>
-              <a:t>12/14/2017</a:t>
+              <a:t>12/15/2017</a:t>
             </a:fld>
             <a:endParaRPr lang="en-US" dirty="0"/>
           </a:p>
@@ -4090,7 +4090,7 @@
             <a:fld id="{5586B75A-687E-405C-8A0B-8D00578BA2C3}" type="datetimeFigureOut">
               <a:rPr lang="en-US" smtClean="0"/>
               <a:pPr/>
-              <a:t>12/14/2017</a:t>
+              <a:t>12/15/2017</a:t>
             </a:fld>
             <a:endParaRPr lang="en-US" dirty="0"/>
           </a:p>
@@ -4347,7 +4347,7 @@
             <a:fld id="{5586B75A-687E-405C-8A0B-8D00578BA2C3}" type="datetimeFigureOut">
               <a:rPr lang="en-US" smtClean="0"/>
               <a:pPr/>
-              <a:t>12/14/2017</a:t>
+              <a:t>12/15/2017</a:t>
             </a:fld>
             <a:endParaRPr lang="en-US" dirty="0"/>
           </a:p>
@@ -4612,7 +4612,7 @@
             <a:fld id="{5586B75A-687E-405C-8A0B-8D00578BA2C3}" type="datetimeFigureOut">
               <a:rPr lang="en-US" smtClean="0"/>
               <a:pPr/>
-              <a:t>12/14/2017</a:t>
+              <a:t>12/15/2017</a:t>
             </a:fld>
             <a:endParaRPr lang="en-US" dirty="0"/>
           </a:p>
@@ -5357,7 +5357,7 @@
             <a:fld id="{5586B75A-687E-405C-8A0B-8D00578BA2C3}" type="datetimeFigureOut">
               <a:rPr lang="en-US" smtClean="0"/>
               <a:pPr/>
-              <a:t>12/14/2017</a:t>
+              <a:t>12/15/2017</a:t>
             </a:fld>
             <a:endParaRPr lang="en-US" dirty="0"/>
           </a:p>
@@ -6414,12 +6414,6 @@
             <a:r>
               <a:rPr lang="pt-BR" sz="2800" dirty="0"/>
               <a:t>Acompanhar investimentos</a:t>
-            </a:r>
-          </a:p>
-          <a:p>
-            <a:r>
-              <a:rPr lang="pt-BR" sz="2800" dirty="0"/>
-              <a:t>Projetar gastos de acordo com o padrão</a:t>
             </a:r>
           </a:p>
           <a:p>

</xml_diff>